<commit_message>
add coupled mode conversion
</commit_message>
<xml_diff>
--- a/NSTX-U High-k Scattering receiver optical calibration_07252024.pptx
+++ b/NSTX-U High-k Scattering receiver optical calibration_07252024.pptx
@@ -5938,8 +5938,8 @@
           </a:p>
         </p:txBody>
       </p:sp>
-      <mc:AlternateContent xmlns:mc="http://schemas.openxmlformats.org/markup-compatibility/2006">
-        <mc:Choice xmlns:a14="http://schemas.microsoft.com/office/drawing/2010/main" Requires="a14">
+      <mc:AlternateContent xmlns:mc="http://schemas.openxmlformats.org/markup-compatibility/2006" xmlns:a14="http://schemas.microsoft.com/office/drawing/2010/main">
+        <mc:Choice Requires="a14">
           <p:sp>
             <p:nvSpPr>
               <p:cNvPr id="33" name="TextBox 32">
@@ -6740,7 +6740,7 @@
             </p:txBody>
           </p:sp>
         </mc:Choice>
-        <mc:Fallback>
+        <mc:Fallback xmlns="">
           <p:sp>
             <p:nvSpPr>
               <p:cNvPr id="33" name="TextBox 32">

</xml_diff>